<commit_message>
Updated Sweet Fleet Tracking Suite Logo
</commit_message>
<xml_diff>
--- a/Presentation.pptx
+++ b/Presentation.pptx
@@ -53,7 +53,7 @@
       </p:grpSpPr>
       <p:sp>
         <p:nvSpPr>
-          <p:cNvPr id="26" name="PlaceHolder 1"/>
+          <p:cNvPr id="23" name="PlaceHolder 1"/>
           <p:cNvSpPr>
             <a:spLocks noGrp="1"/>
           </p:cNvSpPr>
@@ -64,7 +64,7 @@
         <p:spPr>
           <a:xfrm>
             <a:off x="503640" y="301320"/>
-            <a:ext cx="9068760" cy="1262520"/>
+            <a:ext cx="9068400" cy="1262160"/>
           </a:xfrm>
           <a:prstGeom prst="rect">
             <a:avLst/>
@@ -80,7 +80,7 @@
       </p:sp>
       <p:sp>
         <p:nvSpPr>
-          <p:cNvPr id="27" name="PlaceHolder 2"/>
+          <p:cNvPr id="24" name="PlaceHolder 2"/>
           <p:cNvSpPr>
             <a:spLocks noGrp="1"/>
           </p:cNvSpPr>
@@ -91,33 +91,33 @@
         <p:spPr>
           <a:xfrm>
             <a:off x="503640" y="1769400"/>
-            <a:ext cx="9068760" cy="2091600"/>
-          </a:xfrm>
-          <a:prstGeom prst="rect">
-            <a:avLst/>
-          </a:prstGeom>
-        </p:spPr>
-        <p:txBody>
-          <a:bodyPr lIns="0" rIns="0" tIns="0" bIns="0"/>
-          <a:p>
-            <a:endParaRPr/>
-          </a:p>
-        </p:txBody>
-      </p:sp>
-      <p:sp>
-        <p:nvSpPr>
-          <p:cNvPr id="28" name="PlaceHolder 3"/>
-          <p:cNvSpPr>
-            <a:spLocks noGrp="1"/>
-          </p:cNvSpPr>
-          <p:nvPr>
-            <p:ph type="body"/>
-          </p:nvPr>
-        </p:nvSpPr>
-        <p:spPr>
-          <a:xfrm>
-            <a:off x="503640" y="4060080"/>
-            <a:ext cx="9068760" cy="2091600"/>
+            <a:ext cx="9069120" cy="2091960"/>
+          </a:xfrm>
+          <a:prstGeom prst="rect">
+            <a:avLst/>
+          </a:prstGeom>
+        </p:spPr>
+        <p:txBody>
+          <a:bodyPr lIns="0" rIns="0" tIns="0" bIns="0"/>
+          <a:p>
+            <a:endParaRPr/>
+          </a:p>
+        </p:txBody>
+      </p:sp>
+      <p:sp>
+        <p:nvSpPr>
+          <p:cNvPr id="25" name="PlaceHolder 3"/>
+          <p:cNvSpPr>
+            <a:spLocks noGrp="1"/>
+          </p:cNvSpPr>
+          <p:nvPr>
+            <p:ph type="body"/>
+          </p:nvPr>
+        </p:nvSpPr>
+        <p:spPr>
+          <a:xfrm>
+            <a:off x="503640" y="4060440"/>
+            <a:ext cx="9069120" cy="2091960"/>
           </a:xfrm>
           <a:prstGeom prst="rect">
             <a:avLst/>
@@ -154,7 +154,7 @@
       </p:grpSpPr>
       <p:sp>
         <p:nvSpPr>
-          <p:cNvPr id="29" name="PlaceHolder 1"/>
+          <p:cNvPr id="26" name="PlaceHolder 1"/>
           <p:cNvSpPr>
             <a:spLocks noGrp="1"/>
           </p:cNvSpPr>
@@ -165,7 +165,7 @@
         <p:spPr>
           <a:xfrm>
             <a:off x="503640" y="301320"/>
-            <a:ext cx="9068760" cy="1262520"/>
+            <a:ext cx="9068400" cy="1262160"/>
           </a:xfrm>
           <a:prstGeom prst="rect">
             <a:avLst/>
@@ -181,7 +181,7 @@
       </p:sp>
       <p:sp>
         <p:nvSpPr>
-          <p:cNvPr id="30" name="PlaceHolder 2"/>
+          <p:cNvPr id="27" name="PlaceHolder 2"/>
           <p:cNvSpPr>
             <a:spLocks noGrp="1"/>
           </p:cNvSpPr>
@@ -192,22 +192,22 @@
         <p:spPr>
           <a:xfrm>
             <a:off x="503640" y="1769400"/>
-            <a:ext cx="4425480" cy="2091600"/>
-          </a:xfrm>
-          <a:prstGeom prst="rect">
-            <a:avLst/>
-          </a:prstGeom>
-        </p:spPr>
-        <p:txBody>
-          <a:bodyPr lIns="0" rIns="0" tIns="0" bIns="0"/>
-          <a:p>
-            <a:endParaRPr/>
-          </a:p>
-        </p:txBody>
-      </p:sp>
-      <p:sp>
-        <p:nvSpPr>
-          <p:cNvPr id="31" name="PlaceHolder 3"/>
+            <a:ext cx="4425480" cy="2091960"/>
+          </a:xfrm>
+          <a:prstGeom prst="rect">
+            <a:avLst/>
+          </a:prstGeom>
+        </p:spPr>
+        <p:txBody>
+          <a:bodyPr lIns="0" rIns="0" tIns="0" bIns="0"/>
+          <a:p>
+            <a:endParaRPr/>
+          </a:p>
+        </p:txBody>
+      </p:sp>
+      <p:sp>
+        <p:nvSpPr>
+          <p:cNvPr id="28" name="PlaceHolder 3"/>
           <p:cNvSpPr>
             <a:spLocks noGrp="1"/>
           </p:cNvSpPr>
@@ -218,59 +218,59 @@
         <p:spPr>
           <a:xfrm>
             <a:off x="5150880" y="1769400"/>
-            <a:ext cx="4425480" cy="2091600"/>
-          </a:xfrm>
-          <a:prstGeom prst="rect">
-            <a:avLst/>
-          </a:prstGeom>
-        </p:spPr>
-        <p:txBody>
-          <a:bodyPr lIns="0" rIns="0" tIns="0" bIns="0"/>
-          <a:p>
-            <a:endParaRPr/>
-          </a:p>
-        </p:txBody>
-      </p:sp>
-      <p:sp>
-        <p:nvSpPr>
-          <p:cNvPr id="32" name="PlaceHolder 4"/>
-          <p:cNvSpPr>
-            <a:spLocks noGrp="1"/>
-          </p:cNvSpPr>
-          <p:nvPr>
-            <p:ph type="body"/>
-          </p:nvPr>
-        </p:nvSpPr>
-        <p:spPr>
-          <a:xfrm>
-            <a:off x="5150880" y="4060080"/>
-            <a:ext cx="4425480" cy="2091600"/>
-          </a:xfrm>
-          <a:prstGeom prst="rect">
-            <a:avLst/>
-          </a:prstGeom>
-        </p:spPr>
-        <p:txBody>
-          <a:bodyPr lIns="0" rIns="0" tIns="0" bIns="0"/>
-          <a:p>
-            <a:endParaRPr/>
-          </a:p>
-        </p:txBody>
-      </p:sp>
-      <p:sp>
-        <p:nvSpPr>
-          <p:cNvPr id="33" name="PlaceHolder 5"/>
-          <p:cNvSpPr>
-            <a:spLocks noGrp="1"/>
-          </p:cNvSpPr>
-          <p:nvPr>
-            <p:ph type="body"/>
-          </p:nvPr>
-        </p:nvSpPr>
-        <p:spPr>
-          <a:xfrm>
-            <a:off x="503640" y="4060080"/>
-            <a:ext cx="4425480" cy="2091600"/>
+            <a:ext cx="4425480" cy="2091960"/>
+          </a:xfrm>
+          <a:prstGeom prst="rect">
+            <a:avLst/>
+          </a:prstGeom>
+        </p:spPr>
+        <p:txBody>
+          <a:bodyPr lIns="0" rIns="0" tIns="0" bIns="0"/>
+          <a:p>
+            <a:endParaRPr/>
+          </a:p>
+        </p:txBody>
+      </p:sp>
+      <p:sp>
+        <p:nvSpPr>
+          <p:cNvPr id="29" name="PlaceHolder 4"/>
+          <p:cNvSpPr>
+            <a:spLocks noGrp="1"/>
+          </p:cNvSpPr>
+          <p:nvPr>
+            <p:ph type="body"/>
+          </p:nvPr>
+        </p:nvSpPr>
+        <p:spPr>
+          <a:xfrm>
+            <a:off x="5150880" y="4060440"/>
+            <a:ext cx="4425480" cy="2091960"/>
+          </a:xfrm>
+          <a:prstGeom prst="rect">
+            <a:avLst/>
+          </a:prstGeom>
+        </p:spPr>
+        <p:txBody>
+          <a:bodyPr lIns="0" rIns="0" tIns="0" bIns="0"/>
+          <a:p>
+            <a:endParaRPr/>
+          </a:p>
+        </p:txBody>
+      </p:sp>
+      <p:sp>
+        <p:nvSpPr>
+          <p:cNvPr id="30" name="PlaceHolder 5"/>
+          <p:cNvSpPr>
+            <a:spLocks noGrp="1"/>
+          </p:cNvSpPr>
+          <p:nvPr>
+            <p:ph type="body"/>
+          </p:nvPr>
+        </p:nvSpPr>
+        <p:spPr>
+          <a:xfrm>
+            <a:off x="503640" y="4060440"/>
+            <a:ext cx="4425480" cy="2091960"/>
           </a:xfrm>
           <a:prstGeom prst="rect">
             <a:avLst/>
@@ -307,7 +307,7 @@
       </p:grpSpPr>
       <p:sp>
         <p:nvSpPr>
-          <p:cNvPr id="34" name="PlaceHolder 1"/>
+          <p:cNvPr id="31" name="PlaceHolder 1"/>
           <p:cNvSpPr>
             <a:spLocks noGrp="1"/>
           </p:cNvSpPr>
@@ -318,7 +318,7 @@
         <p:spPr>
           <a:xfrm>
             <a:off x="503640" y="301320"/>
-            <a:ext cx="9068760" cy="1262520"/>
+            <a:ext cx="9068400" cy="1262160"/>
           </a:xfrm>
           <a:prstGeom prst="rect">
             <a:avLst/>
@@ -334,7 +334,7 @@
       </p:sp>
       <p:sp>
         <p:nvSpPr>
-          <p:cNvPr id="35" name="PlaceHolder 2"/>
+          <p:cNvPr id="32" name="PlaceHolder 2"/>
           <p:cNvSpPr>
             <a:spLocks noGrp="1"/>
           </p:cNvSpPr>
@@ -345,22 +345,22 @@
         <p:spPr>
           <a:xfrm>
             <a:off x="503640" y="1769400"/>
-            <a:ext cx="9068760" cy="4385520"/>
-          </a:xfrm>
-          <a:prstGeom prst="rect">
-            <a:avLst/>
-          </a:prstGeom>
-        </p:spPr>
-        <p:txBody>
-          <a:bodyPr lIns="0" rIns="0" tIns="0" bIns="0"/>
-          <a:p>
-            <a:endParaRPr/>
-          </a:p>
-        </p:txBody>
-      </p:sp>
-      <p:sp>
-        <p:nvSpPr>
-          <p:cNvPr id="36" name="PlaceHolder 3"/>
+            <a:ext cx="9069120" cy="4385880"/>
+          </a:xfrm>
+          <a:prstGeom prst="rect">
+            <a:avLst/>
+          </a:prstGeom>
+        </p:spPr>
+        <p:txBody>
+          <a:bodyPr lIns="0" rIns="0" tIns="0" bIns="0"/>
+          <a:p>
+            <a:endParaRPr/>
+          </a:p>
+        </p:txBody>
+      </p:sp>
+      <p:sp>
+        <p:nvSpPr>
+          <p:cNvPr id="33" name="PlaceHolder 3"/>
           <p:cNvSpPr>
             <a:spLocks noGrp="1"/>
           </p:cNvSpPr>
@@ -371,7 +371,7 @@
         <p:spPr>
           <a:xfrm>
             <a:off x="503640" y="1769400"/>
-            <a:ext cx="9068760" cy="4385520"/>
+            <a:ext cx="9069120" cy="4385880"/>
           </a:xfrm>
           <a:prstGeom prst="rect">
             <a:avLst/>
@@ -386,7 +386,7 @@
       </p:sp>
       <p:pic>
         <p:nvPicPr>
-          <p:cNvPr id="37" name="" descr=""/>
+          <p:cNvPr id="34" name="" descr=""/>
           <p:cNvPicPr/>
           <p:nvPr/>
         </p:nvPicPr>
@@ -396,8 +396,8 @@
         </p:blipFill>
         <p:spPr>
           <a:xfrm>
-            <a:off x="2289600" y="1769400"/>
-            <a:ext cx="5496480" cy="4385520"/>
+            <a:off x="2289600" y="1769040"/>
+            <a:ext cx="5496840" cy="4385880"/>
           </a:xfrm>
           <a:prstGeom prst="rect">
             <a:avLst/>
@@ -409,7 +409,7 @@
       </p:pic>
       <p:pic>
         <p:nvPicPr>
-          <p:cNvPr id="38" name="" descr=""/>
+          <p:cNvPr id="35" name="" descr=""/>
           <p:cNvPicPr/>
           <p:nvPr/>
         </p:nvPicPr>
@@ -419,8 +419,8 @@
         </p:blipFill>
         <p:spPr>
           <a:xfrm>
-            <a:off x="2289600" y="1769400"/>
-            <a:ext cx="5496480" cy="4385520"/>
+            <a:off x="2289600" y="1769040"/>
+            <a:ext cx="5496840" cy="4385880"/>
           </a:xfrm>
           <a:prstGeom prst="rect">
             <a:avLst/>
@@ -454,7 +454,7 @@
       </p:grpSpPr>
       <p:sp>
         <p:nvSpPr>
-          <p:cNvPr id="5" name="PlaceHolder 1"/>
+          <p:cNvPr id="2" name="PlaceHolder 1"/>
           <p:cNvSpPr>
             <a:spLocks noGrp="1"/>
           </p:cNvSpPr>
@@ -465,7 +465,7 @@
         <p:spPr>
           <a:xfrm>
             <a:off x="503640" y="301320"/>
-            <a:ext cx="9068760" cy="1262520"/>
+            <a:ext cx="9068400" cy="1262160"/>
           </a:xfrm>
           <a:prstGeom prst="rect">
             <a:avLst/>
@@ -481,7 +481,7 @@
       </p:sp>
       <p:sp>
         <p:nvSpPr>
-          <p:cNvPr id="6" name="PlaceHolder 2"/>
+          <p:cNvPr id="3" name="PlaceHolder 2"/>
           <p:cNvSpPr>
             <a:spLocks noGrp="1"/>
           </p:cNvSpPr>
@@ -492,7 +492,7 @@
         <p:spPr>
           <a:xfrm>
             <a:off x="503640" y="1769400"/>
-            <a:ext cx="9068760" cy="4385520"/>
+            <a:ext cx="9069120" cy="4385880"/>
           </a:xfrm>
           <a:prstGeom prst="rect">
             <a:avLst/>
@@ -530,7 +530,7 @@
       </p:grpSpPr>
       <p:sp>
         <p:nvSpPr>
-          <p:cNvPr id="7" name="PlaceHolder 1"/>
+          <p:cNvPr id="4" name="PlaceHolder 1"/>
           <p:cNvSpPr>
             <a:spLocks noGrp="1"/>
           </p:cNvSpPr>
@@ -541,7 +541,7 @@
         <p:spPr>
           <a:xfrm>
             <a:off x="503640" y="301320"/>
-            <a:ext cx="9068760" cy="1262520"/>
+            <a:ext cx="9068400" cy="1262160"/>
           </a:xfrm>
           <a:prstGeom prst="rect">
             <a:avLst/>
@@ -557,7 +557,7 @@
       </p:sp>
       <p:sp>
         <p:nvSpPr>
-          <p:cNvPr id="8" name="PlaceHolder 2"/>
+          <p:cNvPr id="5" name="PlaceHolder 2"/>
           <p:cNvSpPr>
             <a:spLocks noGrp="1"/>
           </p:cNvSpPr>
@@ -568,7 +568,7 @@
         <p:spPr>
           <a:xfrm>
             <a:off x="503640" y="1769400"/>
-            <a:ext cx="9068760" cy="4385520"/>
+            <a:ext cx="9069120" cy="4385880"/>
           </a:xfrm>
           <a:prstGeom prst="rect">
             <a:avLst/>
@@ -605,7 +605,7 @@
       </p:grpSpPr>
       <p:sp>
         <p:nvSpPr>
-          <p:cNvPr id="9" name="PlaceHolder 1"/>
+          <p:cNvPr id="6" name="PlaceHolder 1"/>
           <p:cNvSpPr>
             <a:spLocks noGrp="1"/>
           </p:cNvSpPr>
@@ -616,7 +616,7 @@
         <p:spPr>
           <a:xfrm>
             <a:off x="503640" y="301320"/>
-            <a:ext cx="9068760" cy="1262520"/>
+            <a:ext cx="9068400" cy="1262160"/>
           </a:xfrm>
           <a:prstGeom prst="rect">
             <a:avLst/>
@@ -632,7 +632,7 @@
       </p:sp>
       <p:sp>
         <p:nvSpPr>
-          <p:cNvPr id="10" name="PlaceHolder 2"/>
+          <p:cNvPr id="7" name="PlaceHolder 2"/>
           <p:cNvSpPr>
             <a:spLocks noGrp="1"/>
           </p:cNvSpPr>
@@ -643,22 +643,22 @@
         <p:spPr>
           <a:xfrm>
             <a:off x="503640" y="1769400"/>
-            <a:ext cx="4425480" cy="4385520"/>
-          </a:xfrm>
-          <a:prstGeom prst="rect">
-            <a:avLst/>
-          </a:prstGeom>
-        </p:spPr>
-        <p:txBody>
-          <a:bodyPr lIns="0" rIns="0" tIns="0" bIns="0"/>
-          <a:p>
-            <a:endParaRPr/>
-          </a:p>
-        </p:txBody>
-      </p:sp>
-      <p:sp>
-        <p:nvSpPr>
-          <p:cNvPr id="11" name="PlaceHolder 3"/>
+            <a:ext cx="4425480" cy="4385880"/>
+          </a:xfrm>
+          <a:prstGeom prst="rect">
+            <a:avLst/>
+          </a:prstGeom>
+        </p:spPr>
+        <p:txBody>
+          <a:bodyPr lIns="0" rIns="0" tIns="0" bIns="0"/>
+          <a:p>
+            <a:endParaRPr/>
+          </a:p>
+        </p:txBody>
+      </p:sp>
+      <p:sp>
+        <p:nvSpPr>
+          <p:cNvPr id="8" name="PlaceHolder 3"/>
           <p:cNvSpPr>
             <a:spLocks noGrp="1"/>
           </p:cNvSpPr>
@@ -669,7 +669,7 @@
         <p:spPr>
           <a:xfrm>
             <a:off x="5150880" y="1769400"/>
-            <a:ext cx="4425480" cy="4385520"/>
+            <a:ext cx="4425480" cy="4385880"/>
           </a:xfrm>
           <a:prstGeom prst="rect">
             <a:avLst/>
@@ -706,7 +706,7 @@
       </p:grpSpPr>
       <p:sp>
         <p:nvSpPr>
-          <p:cNvPr id="12" name="PlaceHolder 1"/>
+          <p:cNvPr id="9" name="PlaceHolder 1"/>
           <p:cNvSpPr>
             <a:spLocks noGrp="1"/>
           </p:cNvSpPr>
@@ -717,7 +717,7 @@
         <p:spPr>
           <a:xfrm>
             <a:off x="503640" y="301320"/>
-            <a:ext cx="9068760" cy="1262520"/>
+            <a:ext cx="9068400" cy="1262160"/>
           </a:xfrm>
           <a:prstGeom prst="rect">
             <a:avLst/>
@@ -755,7 +755,7 @@
       </p:grpSpPr>
       <p:sp>
         <p:nvSpPr>
-          <p:cNvPr id="13" name="PlaceHolder 1"/>
+          <p:cNvPr id="10" name="PlaceHolder 1"/>
           <p:cNvSpPr>
             <a:spLocks noGrp="1"/>
           </p:cNvSpPr>
@@ -766,7 +766,7 @@
         <p:spPr>
           <a:xfrm>
             <a:off x="503640" y="301320"/>
-            <a:ext cx="9068760" cy="5853600"/>
+            <a:ext cx="9068400" cy="5851800"/>
           </a:xfrm>
           <a:prstGeom prst="rect">
             <a:avLst/>
@@ -804,7 +804,7 @@
       </p:grpSpPr>
       <p:sp>
         <p:nvSpPr>
-          <p:cNvPr id="14" name="PlaceHolder 1"/>
+          <p:cNvPr id="11" name="PlaceHolder 1"/>
           <p:cNvSpPr>
             <a:spLocks noGrp="1"/>
           </p:cNvSpPr>
@@ -815,7 +815,7 @@
         <p:spPr>
           <a:xfrm>
             <a:off x="503640" y="301320"/>
-            <a:ext cx="9068760" cy="1262520"/>
+            <a:ext cx="9068400" cy="1262160"/>
           </a:xfrm>
           <a:prstGeom prst="rect">
             <a:avLst/>
@@ -831,7 +831,7 @@
       </p:sp>
       <p:sp>
         <p:nvSpPr>
-          <p:cNvPr id="15" name="PlaceHolder 2"/>
+          <p:cNvPr id="12" name="PlaceHolder 2"/>
           <p:cNvSpPr>
             <a:spLocks noGrp="1"/>
           </p:cNvSpPr>
@@ -842,48 +842,48 @@
         <p:spPr>
           <a:xfrm>
             <a:off x="503640" y="1769400"/>
-            <a:ext cx="4425480" cy="2091600"/>
-          </a:xfrm>
-          <a:prstGeom prst="rect">
-            <a:avLst/>
-          </a:prstGeom>
-        </p:spPr>
-        <p:txBody>
-          <a:bodyPr lIns="0" rIns="0" tIns="0" bIns="0"/>
-          <a:p>
-            <a:endParaRPr/>
-          </a:p>
-        </p:txBody>
-      </p:sp>
-      <p:sp>
-        <p:nvSpPr>
-          <p:cNvPr id="16" name="PlaceHolder 3"/>
-          <p:cNvSpPr>
-            <a:spLocks noGrp="1"/>
-          </p:cNvSpPr>
-          <p:nvPr>
-            <p:ph type="body"/>
-          </p:nvPr>
-        </p:nvSpPr>
-        <p:spPr>
-          <a:xfrm>
-            <a:off x="503640" y="4060080"/>
-            <a:ext cx="4425480" cy="2091600"/>
-          </a:xfrm>
-          <a:prstGeom prst="rect">
-            <a:avLst/>
-          </a:prstGeom>
-        </p:spPr>
-        <p:txBody>
-          <a:bodyPr lIns="0" rIns="0" tIns="0" bIns="0"/>
-          <a:p>
-            <a:endParaRPr/>
-          </a:p>
-        </p:txBody>
-      </p:sp>
-      <p:sp>
-        <p:nvSpPr>
-          <p:cNvPr id="17" name="PlaceHolder 4"/>
+            <a:ext cx="4425480" cy="2091960"/>
+          </a:xfrm>
+          <a:prstGeom prst="rect">
+            <a:avLst/>
+          </a:prstGeom>
+        </p:spPr>
+        <p:txBody>
+          <a:bodyPr lIns="0" rIns="0" tIns="0" bIns="0"/>
+          <a:p>
+            <a:endParaRPr/>
+          </a:p>
+        </p:txBody>
+      </p:sp>
+      <p:sp>
+        <p:nvSpPr>
+          <p:cNvPr id="13" name="PlaceHolder 3"/>
+          <p:cNvSpPr>
+            <a:spLocks noGrp="1"/>
+          </p:cNvSpPr>
+          <p:nvPr>
+            <p:ph type="body"/>
+          </p:nvPr>
+        </p:nvSpPr>
+        <p:spPr>
+          <a:xfrm>
+            <a:off x="503640" y="4060440"/>
+            <a:ext cx="4425480" cy="2091960"/>
+          </a:xfrm>
+          <a:prstGeom prst="rect">
+            <a:avLst/>
+          </a:prstGeom>
+        </p:spPr>
+        <p:txBody>
+          <a:bodyPr lIns="0" rIns="0" tIns="0" bIns="0"/>
+          <a:p>
+            <a:endParaRPr/>
+          </a:p>
+        </p:txBody>
+      </p:sp>
+      <p:sp>
+        <p:nvSpPr>
+          <p:cNvPr id="14" name="PlaceHolder 4"/>
           <p:cNvSpPr>
             <a:spLocks noGrp="1"/>
           </p:cNvSpPr>
@@ -894,7 +894,7 @@
         <p:spPr>
           <a:xfrm>
             <a:off x="5150880" y="1769400"/>
-            <a:ext cx="4425480" cy="4385520"/>
+            <a:ext cx="4425480" cy="4385880"/>
           </a:xfrm>
           <a:prstGeom prst="rect">
             <a:avLst/>
@@ -931,7 +931,7 @@
       </p:grpSpPr>
       <p:sp>
         <p:nvSpPr>
-          <p:cNvPr id="18" name="PlaceHolder 1"/>
+          <p:cNvPr id="15" name="PlaceHolder 1"/>
           <p:cNvSpPr>
             <a:spLocks noGrp="1"/>
           </p:cNvSpPr>
@@ -942,7 +942,7 @@
         <p:spPr>
           <a:xfrm>
             <a:off x="503640" y="301320"/>
-            <a:ext cx="9068760" cy="1262520"/>
+            <a:ext cx="9068400" cy="1262160"/>
           </a:xfrm>
           <a:prstGeom prst="rect">
             <a:avLst/>
@@ -958,7 +958,7 @@
       </p:sp>
       <p:sp>
         <p:nvSpPr>
-          <p:cNvPr id="19" name="PlaceHolder 2"/>
+          <p:cNvPr id="16" name="PlaceHolder 2"/>
           <p:cNvSpPr>
             <a:spLocks noGrp="1"/>
           </p:cNvSpPr>
@@ -969,22 +969,22 @@
         <p:spPr>
           <a:xfrm>
             <a:off x="503640" y="1769400"/>
-            <a:ext cx="4425480" cy="4385520"/>
-          </a:xfrm>
-          <a:prstGeom prst="rect">
-            <a:avLst/>
-          </a:prstGeom>
-        </p:spPr>
-        <p:txBody>
-          <a:bodyPr lIns="0" rIns="0" tIns="0" bIns="0"/>
-          <a:p>
-            <a:endParaRPr/>
-          </a:p>
-        </p:txBody>
-      </p:sp>
-      <p:sp>
-        <p:nvSpPr>
-          <p:cNvPr id="20" name="PlaceHolder 3"/>
+            <a:ext cx="4425480" cy="4385880"/>
+          </a:xfrm>
+          <a:prstGeom prst="rect">
+            <a:avLst/>
+          </a:prstGeom>
+        </p:spPr>
+        <p:txBody>
+          <a:bodyPr lIns="0" rIns="0" tIns="0" bIns="0"/>
+          <a:p>
+            <a:endParaRPr/>
+          </a:p>
+        </p:txBody>
+      </p:sp>
+      <p:sp>
+        <p:nvSpPr>
+          <p:cNvPr id="17" name="PlaceHolder 3"/>
           <p:cNvSpPr>
             <a:spLocks noGrp="1"/>
           </p:cNvSpPr>
@@ -995,33 +995,33 @@
         <p:spPr>
           <a:xfrm>
             <a:off x="5150880" y="1769400"/>
-            <a:ext cx="4425480" cy="2091600"/>
-          </a:xfrm>
-          <a:prstGeom prst="rect">
-            <a:avLst/>
-          </a:prstGeom>
-        </p:spPr>
-        <p:txBody>
-          <a:bodyPr lIns="0" rIns="0" tIns="0" bIns="0"/>
-          <a:p>
-            <a:endParaRPr/>
-          </a:p>
-        </p:txBody>
-      </p:sp>
-      <p:sp>
-        <p:nvSpPr>
-          <p:cNvPr id="21" name="PlaceHolder 4"/>
-          <p:cNvSpPr>
-            <a:spLocks noGrp="1"/>
-          </p:cNvSpPr>
-          <p:nvPr>
-            <p:ph type="body"/>
-          </p:nvPr>
-        </p:nvSpPr>
-        <p:spPr>
-          <a:xfrm>
-            <a:off x="5150880" y="4060080"/>
-            <a:ext cx="4425480" cy="2091600"/>
+            <a:ext cx="4425480" cy="2091960"/>
+          </a:xfrm>
+          <a:prstGeom prst="rect">
+            <a:avLst/>
+          </a:prstGeom>
+        </p:spPr>
+        <p:txBody>
+          <a:bodyPr lIns="0" rIns="0" tIns="0" bIns="0"/>
+          <a:p>
+            <a:endParaRPr/>
+          </a:p>
+        </p:txBody>
+      </p:sp>
+      <p:sp>
+        <p:nvSpPr>
+          <p:cNvPr id="18" name="PlaceHolder 4"/>
+          <p:cNvSpPr>
+            <a:spLocks noGrp="1"/>
+          </p:cNvSpPr>
+          <p:nvPr>
+            <p:ph type="body"/>
+          </p:nvPr>
+        </p:nvSpPr>
+        <p:spPr>
+          <a:xfrm>
+            <a:off x="5150880" y="4060440"/>
+            <a:ext cx="4425480" cy="2091960"/>
           </a:xfrm>
           <a:prstGeom prst="rect">
             <a:avLst/>
@@ -1058,7 +1058,7 @@
       </p:grpSpPr>
       <p:sp>
         <p:nvSpPr>
-          <p:cNvPr id="22" name="PlaceHolder 1"/>
+          <p:cNvPr id="19" name="PlaceHolder 1"/>
           <p:cNvSpPr>
             <a:spLocks noGrp="1"/>
           </p:cNvSpPr>
@@ -1069,7 +1069,7 @@
         <p:spPr>
           <a:xfrm>
             <a:off x="503640" y="301320"/>
-            <a:ext cx="9068760" cy="1262520"/>
+            <a:ext cx="9068400" cy="1262160"/>
           </a:xfrm>
           <a:prstGeom prst="rect">
             <a:avLst/>
@@ -1085,7 +1085,7 @@
       </p:sp>
       <p:sp>
         <p:nvSpPr>
-          <p:cNvPr id="23" name="PlaceHolder 2"/>
+          <p:cNvPr id="20" name="PlaceHolder 2"/>
           <p:cNvSpPr>
             <a:spLocks noGrp="1"/>
           </p:cNvSpPr>
@@ -1096,22 +1096,22 @@
         <p:spPr>
           <a:xfrm>
             <a:off x="503640" y="1769400"/>
-            <a:ext cx="4425480" cy="2091600"/>
-          </a:xfrm>
-          <a:prstGeom prst="rect">
-            <a:avLst/>
-          </a:prstGeom>
-        </p:spPr>
-        <p:txBody>
-          <a:bodyPr lIns="0" rIns="0" tIns="0" bIns="0"/>
-          <a:p>
-            <a:endParaRPr/>
-          </a:p>
-        </p:txBody>
-      </p:sp>
-      <p:sp>
-        <p:nvSpPr>
-          <p:cNvPr id="24" name="PlaceHolder 3"/>
+            <a:ext cx="4425480" cy="2091960"/>
+          </a:xfrm>
+          <a:prstGeom prst="rect">
+            <a:avLst/>
+          </a:prstGeom>
+        </p:spPr>
+        <p:txBody>
+          <a:bodyPr lIns="0" rIns="0" tIns="0" bIns="0"/>
+          <a:p>
+            <a:endParaRPr/>
+          </a:p>
+        </p:txBody>
+      </p:sp>
+      <p:sp>
+        <p:nvSpPr>
+          <p:cNvPr id="21" name="PlaceHolder 3"/>
           <p:cNvSpPr>
             <a:spLocks noGrp="1"/>
           </p:cNvSpPr>
@@ -1122,33 +1122,33 @@
         <p:spPr>
           <a:xfrm>
             <a:off x="5150880" y="1769400"/>
-            <a:ext cx="4425480" cy="2091600"/>
-          </a:xfrm>
-          <a:prstGeom prst="rect">
-            <a:avLst/>
-          </a:prstGeom>
-        </p:spPr>
-        <p:txBody>
-          <a:bodyPr lIns="0" rIns="0" tIns="0" bIns="0"/>
-          <a:p>
-            <a:endParaRPr/>
-          </a:p>
-        </p:txBody>
-      </p:sp>
-      <p:sp>
-        <p:nvSpPr>
-          <p:cNvPr id="25" name="PlaceHolder 4"/>
-          <p:cNvSpPr>
-            <a:spLocks noGrp="1"/>
-          </p:cNvSpPr>
-          <p:nvPr>
-            <p:ph type="body"/>
-          </p:nvPr>
-        </p:nvSpPr>
-        <p:spPr>
-          <a:xfrm>
-            <a:off x="503640" y="4060080"/>
-            <a:ext cx="9068760" cy="2091600"/>
+            <a:ext cx="4425480" cy="2091960"/>
+          </a:xfrm>
+          <a:prstGeom prst="rect">
+            <a:avLst/>
+          </a:prstGeom>
+        </p:spPr>
+        <p:txBody>
+          <a:bodyPr lIns="0" rIns="0" tIns="0" bIns="0"/>
+          <a:p>
+            <a:endParaRPr/>
+          </a:p>
+        </p:txBody>
+      </p:sp>
+      <p:sp>
+        <p:nvSpPr>
+          <p:cNvPr id="22" name="PlaceHolder 4"/>
+          <p:cNvSpPr>
+            <a:spLocks noGrp="1"/>
+          </p:cNvSpPr>
+          <p:nvPr>
+            <p:ph type="body"/>
+          </p:nvPr>
+        </p:nvSpPr>
+        <p:spPr>
+          <a:xfrm>
+            <a:off x="503640" y="4060440"/>
+            <a:ext cx="9069120" cy="2091960"/>
           </a:xfrm>
           <a:prstGeom prst="rect">
             <a:avLst/>
@@ -1203,7 +1203,7 @@
         <p:spPr>
           <a:xfrm>
             <a:off x="503640" y="301320"/>
-            <a:ext cx="9068760" cy="1262520"/>
+            <a:ext cx="9068400" cy="1262160"/>
           </a:xfrm>
           <a:prstGeom prst="rect">
             <a:avLst/>
@@ -1212,9 +1212,8 @@
         <p:txBody>
           <a:bodyPr lIns="0" rIns="0" tIns="0" bIns="0" anchor="ctr"/>
           <a:p>
-            <a:pPr algn="ctr"/>
             <a:r>
-              <a:rPr lang="en-US" sz="4400">
+              <a:rPr lang="en-US">
                 <a:latin typeface="Arial"/>
               </a:rPr>
               <a:t>Click to edit the title text format</a:t>
@@ -1236,7 +1235,7 @@
         <p:spPr>
           <a:xfrm>
             <a:off x="503640" y="1769400"/>
-            <a:ext cx="9068760" cy="4385520"/>
+            <a:ext cx="9069120" cy="4385880"/>
           </a:xfrm>
           <a:prstGeom prst="rect">
             <a:avLst/>
@@ -1340,104 +1339,6 @@
               </a:rPr>
               <a:t>Seventh Outline Level</a:t>
             </a:r>
-            <a:endParaRPr/>
-          </a:p>
-        </p:txBody>
-      </p:sp>
-      <p:sp>
-        <p:nvSpPr>
-          <p:cNvPr id="2" name="PlaceHolder 3"/>
-          <p:cNvSpPr>
-            <a:spLocks noGrp="1"/>
-          </p:cNvSpPr>
-          <p:nvPr>
-            <p:ph type="dt"/>
-          </p:nvPr>
-        </p:nvSpPr>
-        <p:spPr>
-          <a:xfrm>
-            <a:off x="503640" y="6888960"/>
-            <a:ext cx="2347560" cy="521280"/>
-          </a:xfrm>
-          <a:prstGeom prst="rect">
-            <a:avLst/>
-          </a:prstGeom>
-        </p:spPr>
-        <p:txBody>
-          <a:bodyPr lIns="0" rIns="0" tIns="0" bIns="0"/>
-          <a:p>
-            <a:r>
-              <a:rPr lang="en-US" sz="1400">
-                <a:latin typeface="Times New Roman"/>
-              </a:rPr>
-              <a:t>&lt;date/time&gt;</a:t>
-            </a:r>
-            <a:endParaRPr/>
-          </a:p>
-        </p:txBody>
-      </p:sp>
-      <p:sp>
-        <p:nvSpPr>
-          <p:cNvPr id="3" name="PlaceHolder 4"/>
-          <p:cNvSpPr>
-            <a:spLocks noGrp="1"/>
-          </p:cNvSpPr>
-          <p:nvPr>
-            <p:ph type="ftr"/>
-          </p:nvPr>
-        </p:nvSpPr>
-        <p:spPr>
-          <a:xfrm>
-            <a:off x="3445920" y="6888960"/>
-            <a:ext cx="3193920" cy="521280"/>
-          </a:xfrm>
-          <a:prstGeom prst="rect">
-            <a:avLst/>
-          </a:prstGeom>
-        </p:spPr>
-        <p:txBody>
-          <a:bodyPr lIns="0" rIns="0" tIns="0" bIns="0"/>
-          <a:p>
-            <a:pPr algn="ctr"/>
-            <a:r>
-              <a:rPr lang="en-US" sz="1400">
-                <a:latin typeface="Times New Roman"/>
-              </a:rPr>
-              <a:t>&lt;footer&gt;</a:t>
-            </a:r>
-            <a:endParaRPr/>
-          </a:p>
-        </p:txBody>
-      </p:sp>
-      <p:sp>
-        <p:nvSpPr>
-          <p:cNvPr id="4" name="PlaceHolder 5"/>
-          <p:cNvSpPr>
-            <a:spLocks noGrp="1"/>
-          </p:cNvSpPr>
-          <p:nvPr>
-            <p:ph type="sldNum"/>
-          </p:nvPr>
-        </p:nvSpPr>
-        <p:spPr>
-          <a:xfrm>
-            <a:off x="7224840" y="6888960"/>
-            <a:ext cx="2347560" cy="521280"/>
-          </a:xfrm>
-          <a:prstGeom prst="rect">
-            <a:avLst/>
-          </a:prstGeom>
-        </p:spPr>
-        <p:txBody>
-          <a:bodyPr lIns="0" rIns="0" tIns="0" bIns="0"/>
-          <a:p>
-            <a:pPr algn="r"/>
-            <a:fld id="{53CB688C-D518-4EC1-AF6D-C54585EE6EBA}" type="slidenum">
-              <a:rPr lang="en-US" sz="1400">
-                <a:latin typeface="Times New Roman"/>
-              </a:rPr>
-              <a:t>&lt;number&gt;</a:t>
-            </a:fld>
             <a:endParaRPr/>
           </a:p>
         </p:txBody>
@@ -1481,7 +1382,7 @@
       </p:grpSpPr>
       <p:pic>
         <p:nvPicPr>
-          <p:cNvPr id="39" name="" descr=""/>
+          <p:cNvPr id="36" name="" descr=""/>
           <p:cNvPicPr/>
           <p:nvPr/>
         </p:nvPicPr>
@@ -1491,8 +1392,8 @@
         </p:blipFill>
         <p:spPr>
           <a:xfrm>
-            <a:off x="-365400" y="73440"/>
-            <a:ext cx="10431720" cy="6046200"/>
+            <a:off x="-671400" y="473760"/>
+            <a:ext cx="10985040" cy="6363000"/>
           </a:xfrm>
           <a:prstGeom prst="rect">
             <a:avLst/>

</xml_diff>